<commit_message>
uploading files with documentation
</commit_message>
<xml_diff>
--- a/new.pptx
+++ b/new.pptx
@@ -5,7 +5,10 @@
     <p:sldMasterId id="2147483648" r:id="rId1"/>
   </p:sldMasterIdLst>
   <p:sldIdLst>
-    <p:sldId id="256" r:id="rId2"/>
+    <p:sldId id="257" r:id="rId2"/>
+    <p:sldId id="256" r:id="rId3"/>
+    <p:sldId id="258" r:id="rId4"/>
+    <p:sldId id="259" r:id="rId5"/>
   </p:sldIdLst>
   <p:sldSz cx="14630400" cy="8229600"/>
   <p:notesSz cx="6858000" cy="9144000"/>
@@ -302,7 +305,7 @@
           <a:p>
             <a:fld id="{5BCAD085-E8A6-8845-BD4E-CB4CCA059FC4}" type="datetimeFigureOut">
               <a:rPr lang="en-US" smtClean="0"/>
-              <a:t>12/6/21</a:t>
+              <a:t>12/7/21</a:t>
             </a:fld>
             <a:endParaRPr lang="en-US"/>
           </a:p>
@@ -470,7 +473,7 @@
           <a:p>
             <a:fld id="{5BCAD085-E8A6-8845-BD4E-CB4CCA059FC4}" type="datetimeFigureOut">
               <a:rPr lang="en-US" smtClean="0"/>
-              <a:t>12/6/21</a:t>
+              <a:t>12/7/21</a:t>
             </a:fld>
             <a:endParaRPr lang="en-US"/>
           </a:p>
@@ -648,7 +651,7 @@
           <a:p>
             <a:fld id="{5BCAD085-E8A6-8845-BD4E-CB4CCA059FC4}" type="datetimeFigureOut">
               <a:rPr lang="en-US" smtClean="0"/>
-              <a:t>12/6/21</a:t>
+              <a:t>12/7/21</a:t>
             </a:fld>
             <a:endParaRPr lang="en-US"/>
           </a:p>
@@ -816,7 +819,7 @@
           <a:p>
             <a:fld id="{5BCAD085-E8A6-8845-BD4E-CB4CCA059FC4}" type="datetimeFigureOut">
               <a:rPr lang="en-US" smtClean="0"/>
-              <a:t>12/6/21</a:t>
+              <a:t>12/7/21</a:t>
             </a:fld>
             <a:endParaRPr lang="en-US"/>
           </a:p>
@@ -1061,7 +1064,7 @@
           <a:p>
             <a:fld id="{5BCAD085-E8A6-8845-BD4E-CB4CCA059FC4}" type="datetimeFigureOut">
               <a:rPr lang="en-US" smtClean="0"/>
-              <a:t>12/6/21</a:t>
+              <a:t>12/7/21</a:t>
             </a:fld>
             <a:endParaRPr lang="en-US"/>
           </a:p>
@@ -1346,7 +1349,7 @@
           <a:p>
             <a:fld id="{5BCAD085-E8A6-8845-BD4E-CB4CCA059FC4}" type="datetimeFigureOut">
               <a:rPr lang="en-US" smtClean="0"/>
-              <a:t>12/6/21</a:t>
+              <a:t>12/7/21</a:t>
             </a:fld>
             <a:endParaRPr lang="en-US"/>
           </a:p>
@@ -1765,7 +1768,7 @@
           <a:p>
             <a:fld id="{5BCAD085-E8A6-8845-BD4E-CB4CCA059FC4}" type="datetimeFigureOut">
               <a:rPr lang="en-US" smtClean="0"/>
-              <a:t>12/6/21</a:t>
+              <a:t>12/7/21</a:t>
             </a:fld>
             <a:endParaRPr lang="en-US"/>
           </a:p>
@@ -1882,7 +1885,7 @@
           <a:p>
             <a:fld id="{5BCAD085-E8A6-8845-BD4E-CB4CCA059FC4}" type="datetimeFigureOut">
               <a:rPr lang="en-US" smtClean="0"/>
-              <a:t>12/6/21</a:t>
+              <a:t>12/7/21</a:t>
             </a:fld>
             <a:endParaRPr lang="en-US"/>
           </a:p>
@@ -1977,7 +1980,7 @@
           <a:p>
             <a:fld id="{5BCAD085-E8A6-8845-BD4E-CB4CCA059FC4}" type="datetimeFigureOut">
               <a:rPr lang="en-US" smtClean="0"/>
-              <a:t>12/6/21</a:t>
+              <a:t>12/7/21</a:t>
             </a:fld>
             <a:endParaRPr lang="en-US"/>
           </a:p>
@@ -2252,7 +2255,7 @@
           <a:p>
             <a:fld id="{5BCAD085-E8A6-8845-BD4E-CB4CCA059FC4}" type="datetimeFigureOut">
               <a:rPr lang="en-US" smtClean="0"/>
-              <a:t>12/6/21</a:t>
+              <a:t>12/7/21</a:t>
             </a:fld>
             <a:endParaRPr lang="en-US"/>
           </a:p>
@@ -2504,7 +2507,7 @@
           <a:p>
             <a:fld id="{5BCAD085-E8A6-8845-BD4E-CB4CCA059FC4}" type="datetimeFigureOut">
               <a:rPr lang="en-US" smtClean="0"/>
-              <a:t>12/6/21</a:t>
+              <a:t>12/7/21</a:t>
             </a:fld>
             <a:endParaRPr lang="en-US"/>
           </a:p>
@@ -2715,7 +2718,7 @@
           <a:p>
             <a:fld id="{5BCAD085-E8A6-8845-BD4E-CB4CCA059FC4}" type="datetimeFigureOut">
               <a:rPr lang="en-US" smtClean="0"/>
-              <a:t>12/6/21</a:t>
+              <a:t>12/7/21</a:t>
             </a:fld>
             <a:endParaRPr lang="en-US"/>
           </a:p>
@@ -3090,386 +3093,659 @@
           <a:chExt cx="0" cy="0"/>
         </a:xfrm>
       </p:grpSpPr>
-      <p:sp>
-        <p:nvSpPr>
-          <p:cNvPr id="2" name="text4" descr="test" title="test"/>
-          <p:cNvSpPr/>
-          <p:nvPr/>
-        </p:nvSpPr>
-        <p:spPr>
-          <a:xfrm>
-            <a:off x="245827" y="1782133"/>
-            <a:ext cx="3428102" cy="4112486"/>
-          </a:xfrm>
-          <a:prstGeom prst="rect">
-            <a:avLst/>
-          </a:prstGeom>
-          <a:solidFill>
-            <a:srgbClr val="C5E0B4"/>
-          </a:solidFill>
-          <a:ln>
-            <a:solidFill>
-              <a:srgbClr val="000000"/>
-            </a:solidFill>
-          </a:ln>
-        </p:spPr>
-        <p:style>
-          <a:lnRef idx="1">
-            <a:schemeClr val="accent1"/>
-          </a:lnRef>
-          <a:fillRef idx="3">
-            <a:schemeClr val="accent1"/>
-          </a:fillRef>
-          <a:effectRef idx="2">
-            <a:schemeClr val="accent1"/>
-          </a:effectRef>
-          <a:fontRef idx="minor">
-            <a:schemeClr val="lt1"/>
-          </a:fontRef>
-        </p:style>
-        <p:txBody>
-          <a:bodyPr rtlCol="0" anchor="ctr"/>
-          <a:lstStyle/>
-          <a:p>
-            <a:r>
-              <a:t>0</a:t>
-            </a:r>
-          </a:p>
-        </p:txBody>
-      </p:sp>
-      <p:sp>
-        <p:nvSpPr>
-          <p:cNvPr id="11" name="text3">
+    </p:spTree>
+    <p:extLst>
+      <p:ext uri="{BB962C8B-B14F-4D97-AF65-F5344CB8AC3E}">
+        <p14:creationId xmlns:p14="http://schemas.microsoft.com/office/powerpoint/2010/main" val="980982984"/>
+      </p:ext>
+    </p:extLst>
+  </p:cSld>
+  <p:clrMapOvr>
+    <a:masterClrMapping/>
+  </p:clrMapOvr>
+</p:sld>
+</file>
+
+<file path=ppt/slides/slide2.xml><?xml version="1.0" encoding="utf-8"?>
+<p:sld xmlns:a="http://schemas.openxmlformats.org/drawingml/2006/main" xmlns:r="http://schemas.openxmlformats.org/officeDocument/2006/relationships" xmlns:p="http://schemas.openxmlformats.org/presentationml/2006/main">
+  <p:cSld>
+    <p:spTree>
+      <p:nvGrpSpPr>
+        <p:cNvPr id="1" name=""/>
+        <p:cNvGrpSpPr/>
+        <p:nvPr/>
+      </p:nvGrpSpPr>
+      <p:grpSpPr>
+        <a:xfrm>
+          <a:off x="0" y="0"/>
+          <a:ext cx="0" cy="0"/>
+          <a:chOff x="0" y="0"/>
+          <a:chExt cx="0" cy="0"/>
+        </a:xfrm>
+      </p:grpSpPr>
+      <p:grpSp>
+        <p:nvGrpSpPr>
+          <p:cNvPr id="2" name="event1">
             <a:extLst>
               <a:ext uri="{FF2B5EF4-FFF2-40B4-BE49-F238E27FC236}">
-                <a16:creationId xmlns:a16="http://schemas.microsoft.com/office/drawing/2014/main" id="{A9197207-7622-5048-AF9E-547963E49521}"/>
+                <a16:creationId xmlns:a16="http://schemas.microsoft.com/office/drawing/2014/main" id="{21D57C31-86BF-3549-8C11-2D41F0CAB1DD}"/>
               </a:ext>
             </a:extLst>
           </p:cNvPr>
-          <p:cNvSpPr/>
+          <p:cNvGrpSpPr/>
           <p:nvPr/>
-        </p:nvSpPr>
-        <p:spPr>
+        </p:nvGrpSpPr>
+        <p:grpSpPr>
           <a:xfrm>
-            <a:off x="3826329" y="1782133"/>
-            <a:ext cx="3428102" cy="4112486"/>
+            <a:off x="10987333" y="1006119"/>
+            <a:ext cx="3428102" cy="4888500"/>
+            <a:chOff x="10987333" y="1006119"/>
+            <a:chExt cx="3428102" cy="4888500"/>
           </a:xfrm>
-          <a:prstGeom prst="rect">
-            <a:avLst/>
-          </a:prstGeom>
-          <a:solidFill>
-            <a:srgbClr val="C5E0B4"/>
-          </a:solidFill>
-          <a:ln>
+        </p:grpSpPr>
+        <p:sp>
+          <p:nvSpPr>
+            <p:cNvPr id="16" name="head">
+              <a:extLst>
+                <a:ext uri="{FF2B5EF4-FFF2-40B4-BE49-F238E27FC236}">
+                  <a16:creationId xmlns:a16="http://schemas.microsoft.com/office/drawing/2014/main" id="{FEE5B678-B000-1544-9111-B266DBCC1B62}"/>
+                </a:ext>
+              </a:extLst>
+            </p:cNvPr>
+            <p:cNvSpPr/>
+            <p:nvPr/>
+          </p:nvSpPr>
+          <p:spPr>
+            <a:xfrm>
+              <a:off x="10987333" y="1006119"/>
+              <a:ext cx="3428102" cy="678040"/>
+            </a:xfrm>
+            <a:prstGeom prst="rect">
+              <a:avLst/>
+            </a:prstGeom>
             <a:solidFill>
-              <a:srgbClr val="000000"/>
+              <a:schemeClr val="accent1">
+                <a:lumMod val="60000"/>
+                <a:lumOff val="40000"/>
+              </a:schemeClr>
             </a:solidFill>
-          </a:ln>
-        </p:spPr>
-        <p:style>
-          <a:lnRef idx="1">
-            <a:schemeClr val="accent1"/>
-          </a:lnRef>
-          <a:fillRef idx="3">
-            <a:schemeClr val="accent1"/>
-          </a:fillRef>
-          <a:effectRef idx="2">
-            <a:schemeClr val="accent1"/>
-          </a:effectRef>
-          <a:fontRef idx="minor">
-            <a:schemeClr val="lt1"/>
-          </a:fontRef>
-        </p:style>
-        <p:txBody>
-          <a:bodyPr rtlCol="0" anchor="ctr"/>
-          <a:lstStyle/>
-          <a:p>
-            <a:r>
-              <a:t>1</a:t>
-            </a:r>
-          </a:p>
-        </p:txBody>
-      </p:sp>
-      <p:sp>
-        <p:nvSpPr>
-          <p:cNvPr id="10" name="text2">
+            <a:ln>
+              <a:solidFill>
+                <a:srgbClr val="000000"/>
+              </a:solidFill>
+            </a:ln>
+          </p:spPr>
+          <p:style>
+            <a:lnRef idx="1">
+              <a:schemeClr val="accent1"/>
+            </a:lnRef>
+            <a:fillRef idx="3">
+              <a:schemeClr val="accent1"/>
+            </a:fillRef>
+            <a:effectRef idx="2">
+              <a:schemeClr val="accent1"/>
+            </a:effectRef>
+            <a:fontRef idx="minor">
+              <a:schemeClr val="lt1"/>
+            </a:fontRef>
+          </p:style>
+          <p:txBody>
+            <a:bodyPr rtlCol="0" anchor="ctr"/>
+            <a:lstStyle/>
+            <a:p>
+              <a:pPr algn="ctr"/>
+              <a:r>
+                <a:rPr b="1" sz="2400">
+                  <a:solidFill>
+                    <a:srgbClr val="000000"/>
+                  </a:solidFill>
+                  <a:latin typeface="Calibri"/>
+                </a:rPr>
+                <a:t>כותרת אירוע 1</a:t>
+              </a:r>
+              <a:endParaRPr b="1" dirty="0">
+                <a:solidFill>
+                  <a:schemeClr val="tx1"/>
+                </a:solidFill>
+              </a:endParaRPr>
+            </a:p>
+          </p:txBody>
+        </p:sp>
+        <p:sp>
+          <p:nvSpPr>
+            <p:cNvPr id="25" name="description">
+              <a:extLst>
+                <a:ext uri="{FF2B5EF4-FFF2-40B4-BE49-F238E27FC236}">
+                  <a16:creationId xmlns:a16="http://schemas.microsoft.com/office/drawing/2014/main" id="{BA557B7E-6A41-9D46-AE23-DE2AEF6CDE47}"/>
+                </a:ext>
+              </a:extLst>
+            </p:cNvPr>
+            <p:cNvSpPr/>
+            <p:nvPr/>
+          </p:nvSpPr>
+          <p:spPr>
+            <a:xfrm>
+              <a:off x="10987333" y="1782133"/>
+              <a:ext cx="3428102" cy="4112486"/>
+            </a:xfrm>
+            <a:prstGeom prst="rect">
+              <a:avLst/>
+            </a:prstGeom>
+            <a:solidFill>
+              <a:srgbClr val="C5E0B4"/>
+            </a:solidFill>
+            <a:ln>
+              <a:solidFill>
+                <a:srgbClr val="000000"/>
+              </a:solidFill>
+            </a:ln>
+          </p:spPr>
+          <p:style>
+            <a:lnRef idx="1">
+              <a:schemeClr val="accent1"/>
+            </a:lnRef>
+            <a:fillRef idx="3">
+              <a:schemeClr val="accent1"/>
+            </a:fillRef>
+            <a:effectRef idx="2">
+              <a:schemeClr val="accent1"/>
+            </a:effectRef>
+            <a:fontRef idx="minor">
+              <a:schemeClr val="lt1"/>
+            </a:fontRef>
+          </p:style>
+          <p:txBody>
+            <a:bodyPr rtlCol="0" anchor="t"/>
+            <a:lstStyle/>
+            <a:p>
+              <a:pPr marL="0" algn="r" defTabSz="457200" rtl="0" eaLnBrk="1" latinLnBrk="0" hangingPunct="1"/>
+              <a:r>
+                <a:rPr sz="1800">
+                  <a:solidFill>
+                    <a:srgbClr val="000000"/>
+                  </a:solidFill>
+                  <a:latin typeface="Calibri"/>
+                </a:rPr>
+                <a:t>תיאור אירוע 1</a:t>
+              </a:r>
+              <a:endParaRPr dirty="0">
+                <a:solidFill>
+                  <a:schemeClr val="tx1"/>
+                </a:solidFill>
+              </a:endParaRPr>
+            </a:p>
+          </p:txBody>
+        </p:sp>
+      </p:grpSp>
+      <p:grpSp>
+        <p:nvGrpSpPr>
+          <p:cNvPr id="3" name="event2">
             <a:extLst>
               <a:ext uri="{FF2B5EF4-FFF2-40B4-BE49-F238E27FC236}">
-                <a16:creationId xmlns:a16="http://schemas.microsoft.com/office/drawing/2014/main" id="{40D3F9CF-9782-0440-8967-3B3E933A5F6D}"/>
+                <a16:creationId xmlns:a16="http://schemas.microsoft.com/office/drawing/2014/main" id="{DE55FBC5-9C53-9D4D-B84D-190D4B34E3BE}"/>
               </a:ext>
             </a:extLst>
           </p:cNvPr>
-          <p:cNvSpPr/>
+          <p:cNvGrpSpPr/>
           <p:nvPr/>
-        </p:nvSpPr>
-        <p:spPr>
+        </p:nvGrpSpPr>
+        <p:grpSpPr>
           <a:xfrm>
-            <a:off x="7406831" y="1782133"/>
-            <a:ext cx="3428102" cy="4112486"/>
+            <a:off x="7367833" y="1006119"/>
+            <a:ext cx="3428102" cy="4888500"/>
+            <a:chOff x="7367833" y="1006119"/>
+            <a:chExt cx="3428102" cy="4888500"/>
           </a:xfrm>
-          <a:prstGeom prst="rect">
-            <a:avLst/>
-          </a:prstGeom>
-          <a:solidFill>
-            <a:srgbClr val="C5E0B4"/>
-          </a:solidFill>
-          <a:ln>
+        </p:grpSpPr>
+        <p:sp>
+          <p:nvSpPr>
+            <p:cNvPr id="26" name="head">
+              <a:extLst>
+                <a:ext uri="{FF2B5EF4-FFF2-40B4-BE49-F238E27FC236}">
+                  <a16:creationId xmlns:a16="http://schemas.microsoft.com/office/drawing/2014/main" id="{C1F17590-EE40-C04F-963C-759CE997910A}"/>
+                </a:ext>
+              </a:extLst>
+            </p:cNvPr>
+            <p:cNvSpPr/>
+            <p:nvPr/>
+          </p:nvSpPr>
+          <p:spPr>
+            <a:xfrm>
+              <a:off x="7367833" y="1006119"/>
+              <a:ext cx="3428102" cy="678040"/>
+            </a:xfrm>
+            <a:prstGeom prst="rect">
+              <a:avLst/>
+            </a:prstGeom>
             <a:solidFill>
-              <a:srgbClr val="000000"/>
+              <a:schemeClr val="accent1">
+                <a:lumMod val="60000"/>
+                <a:lumOff val="40000"/>
+              </a:schemeClr>
             </a:solidFill>
-          </a:ln>
-        </p:spPr>
-        <p:style>
-          <a:lnRef idx="1">
-            <a:schemeClr val="accent1"/>
-          </a:lnRef>
-          <a:fillRef idx="3">
-            <a:schemeClr val="accent1"/>
-          </a:fillRef>
-          <a:effectRef idx="2">
-            <a:schemeClr val="accent1"/>
-          </a:effectRef>
-          <a:fontRef idx="minor">
-            <a:schemeClr val="lt1"/>
-          </a:fontRef>
-        </p:style>
-        <p:txBody>
-          <a:bodyPr rtlCol="0" anchor="ctr"/>
-          <a:lstStyle/>
-          <a:p>
-            <a:r>
-              <a:t>2</a:t>
-            </a:r>
-          </a:p>
-        </p:txBody>
-      </p:sp>
-      <p:sp>
-        <p:nvSpPr>
-          <p:cNvPr id="9" name="text1">
+            <a:ln>
+              <a:solidFill>
+                <a:srgbClr val="000000"/>
+              </a:solidFill>
+            </a:ln>
+          </p:spPr>
+          <p:style>
+            <a:lnRef idx="1">
+              <a:schemeClr val="accent1"/>
+            </a:lnRef>
+            <a:fillRef idx="3">
+              <a:schemeClr val="accent1"/>
+            </a:fillRef>
+            <a:effectRef idx="2">
+              <a:schemeClr val="accent1"/>
+            </a:effectRef>
+            <a:fontRef idx="minor">
+              <a:schemeClr val="lt1"/>
+            </a:fontRef>
+          </p:style>
+          <p:txBody>
+            <a:bodyPr rtlCol="0" anchor="ctr"/>
+            <a:lstStyle/>
+            <a:p>
+              <a:pPr algn="ctr"/>
+              <a:r>
+                <a:rPr b="1" sz="2400">
+                  <a:solidFill>
+                    <a:srgbClr val="000000"/>
+                  </a:solidFill>
+                  <a:latin typeface="Calibri"/>
+                </a:rPr>
+                <a:t>כותרת אירוע 2</a:t>
+              </a:r>
+              <a:endParaRPr sz="2400" dirty="0"/>
+            </a:p>
+          </p:txBody>
+        </p:sp>
+        <p:sp>
+          <p:nvSpPr>
+            <p:cNvPr id="29" name="description">
+              <a:extLst>
+                <a:ext uri="{FF2B5EF4-FFF2-40B4-BE49-F238E27FC236}">
+                  <a16:creationId xmlns:a16="http://schemas.microsoft.com/office/drawing/2014/main" id="{0735DE96-C1A4-4C4A-94D6-8C5E96B1AB2F}"/>
+                </a:ext>
+              </a:extLst>
+            </p:cNvPr>
+            <p:cNvSpPr/>
+            <p:nvPr/>
+          </p:nvSpPr>
+          <p:spPr>
+            <a:xfrm>
+              <a:off x="7367833" y="1782133"/>
+              <a:ext cx="3428102" cy="4112486"/>
+            </a:xfrm>
+            <a:prstGeom prst="rect">
+              <a:avLst/>
+            </a:prstGeom>
+            <a:solidFill>
+              <a:srgbClr val="C5E0B4"/>
+            </a:solidFill>
+            <a:ln>
+              <a:solidFill>
+                <a:srgbClr val="000000"/>
+              </a:solidFill>
+            </a:ln>
+          </p:spPr>
+          <p:style>
+            <a:lnRef idx="1">
+              <a:schemeClr val="accent1"/>
+            </a:lnRef>
+            <a:fillRef idx="3">
+              <a:schemeClr val="accent1"/>
+            </a:fillRef>
+            <a:effectRef idx="2">
+              <a:schemeClr val="accent1"/>
+            </a:effectRef>
+            <a:fontRef idx="minor">
+              <a:schemeClr val="lt1"/>
+            </a:fontRef>
+          </p:style>
+          <p:txBody>
+            <a:bodyPr rtlCol="0" anchor="t"/>
+            <a:lstStyle/>
+            <a:p>
+              <a:pPr marL="0" algn="r" defTabSz="457200" rtl="0" eaLnBrk="1" latinLnBrk="0" hangingPunct="1"/>
+              <a:r>
+                <a:rPr sz="1800">
+                  <a:solidFill>
+                    <a:srgbClr val="000000"/>
+                  </a:solidFill>
+                  <a:latin typeface="Calibri"/>
+                </a:rPr>
+                <a:t>תיאור אירוע 2</a:t>
+              </a:r>
+              <a:endParaRPr dirty="0"/>
+            </a:p>
+          </p:txBody>
+        </p:sp>
+      </p:grpSp>
+      <p:grpSp>
+        <p:nvGrpSpPr>
+          <p:cNvPr id="4" name="event3">
             <a:extLst>
               <a:ext uri="{FF2B5EF4-FFF2-40B4-BE49-F238E27FC236}">
-                <a16:creationId xmlns:a16="http://schemas.microsoft.com/office/drawing/2014/main" id="{00EA08AC-298F-0B4E-B4E6-2A55000F65D7}"/>
+                <a16:creationId xmlns:a16="http://schemas.microsoft.com/office/drawing/2014/main" id="{8D698F21-37D9-1249-B43C-A016559E38E5}"/>
               </a:ext>
             </a:extLst>
           </p:cNvPr>
-          <p:cNvSpPr/>
+          <p:cNvGrpSpPr/>
           <p:nvPr/>
-        </p:nvSpPr>
-        <p:spPr>
+        </p:nvGrpSpPr>
+        <p:grpSpPr>
           <a:xfrm>
-            <a:off x="10987333" y="1782133"/>
-            <a:ext cx="3428102" cy="4112486"/>
+            <a:off x="3748333" y="1012319"/>
+            <a:ext cx="3428102" cy="4882300"/>
+            <a:chOff x="3748333" y="1012319"/>
+            <a:chExt cx="3428102" cy="4882300"/>
           </a:xfrm>
-          <a:prstGeom prst="rect">
-            <a:avLst/>
-          </a:prstGeom>
-          <a:solidFill>
-            <a:srgbClr val="C5E0B4"/>
-          </a:solidFill>
-          <a:ln>
+        </p:grpSpPr>
+        <p:sp>
+          <p:nvSpPr>
+            <p:cNvPr id="27" name="head">
+              <a:extLst>
+                <a:ext uri="{FF2B5EF4-FFF2-40B4-BE49-F238E27FC236}">
+                  <a16:creationId xmlns:a16="http://schemas.microsoft.com/office/drawing/2014/main" id="{8B131545-E880-AC4F-8174-C123EDCAE1A1}"/>
+                </a:ext>
+              </a:extLst>
+            </p:cNvPr>
+            <p:cNvSpPr/>
+            <p:nvPr/>
+          </p:nvSpPr>
+          <p:spPr>
+            <a:xfrm>
+              <a:off x="3748333" y="1012319"/>
+              <a:ext cx="3428102" cy="678040"/>
+            </a:xfrm>
+            <a:prstGeom prst="rect">
+              <a:avLst/>
+            </a:prstGeom>
             <a:solidFill>
-              <a:srgbClr val="000000"/>
+              <a:schemeClr val="accent1">
+                <a:lumMod val="60000"/>
+                <a:lumOff val="40000"/>
+              </a:schemeClr>
             </a:solidFill>
-          </a:ln>
-        </p:spPr>
-        <p:style>
-          <a:lnRef idx="1">
-            <a:schemeClr val="accent1"/>
-          </a:lnRef>
-          <a:fillRef idx="3">
-            <a:schemeClr val="accent1"/>
-          </a:fillRef>
-          <a:effectRef idx="2">
-            <a:schemeClr val="accent1"/>
-          </a:effectRef>
-          <a:fontRef idx="minor">
-            <a:schemeClr val="lt1"/>
-          </a:fontRef>
-        </p:style>
-        <p:txBody>
-          <a:bodyPr rtlCol="0" anchor="ctr"/>
-          <a:lstStyle/>
-          <a:p>
-            <a:r>
-              <a:t>3</a:t>
-            </a:r>
-          </a:p>
-        </p:txBody>
-      </p:sp>
-      <p:sp>
-        <p:nvSpPr>
-          <p:cNvPr id="12" name="subject4">
+            <a:ln>
+              <a:solidFill>
+                <a:srgbClr val="000000"/>
+              </a:solidFill>
+            </a:ln>
+          </p:spPr>
+          <p:style>
+            <a:lnRef idx="1">
+              <a:schemeClr val="accent1"/>
+            </a:lnRef>
+            <a:fillRef idx="3">
+              <a:schemeClr val="accent1"/>
+            </a:fillRef>
+            <a:effectRef idx="2">
+              <a:schemeClr val="accent1"/>
+            </a:effectRef>
+            <a:fontRef idx="minor">
+              <a:schemeClr val="lt1"/>
+            </a:fontRef>
+          </p:style>
+          <p:txBody>
+            <a:bodyPr rtlCol="0" anchor="ctr"/>
+            <a:lstStyle/>
+            <a:p>
+              <a:pPr algn="ctr"/>
+              <a:r>
+                <a:rPr b="1" sz="2400">
+                  <a:solidFill>
+                    <a:srgbClr val="000000"/>
+                  </a:solidFill>
+                  <a:latin typeface="Calibri"/>
+                </a:rPr>
+                <a:t/>
+              </a:r>
+              <a:endParaRPr dirty="0"/>
+            </a:p>
+          </p:txBody>
+        </p:sp>
+        <p:sp>
+          <p:nvSpPr>
+            <p:cNvPr id="30" name="description">
+              <a:extLst>
+                <a:ext uri="{FF2B5EF4-FFF2-40B4-BE49-F238E27FC236}">
+                  <a16:creationId xmlns:a16="http://schemas.microsoft.com/office/drawing/2014/main" id="{A47C5602-A593-1E48-90B8-0B00559ACE32}"/>
+                </a:ext>
+              </a:extLst>
+            </p:cNvPr>
+            <p:cNvSpPr/>
+            <p:nvPr/>
+          </p:nvSpPr>
+          <p:spPr>
+            <a:xfrm>
+              <a:off x="3748333" y="1782133"/>
+              <a:ext cx="3428102" cy="4112486"/>
+            </a:xfrm>
+            <a:prstGeom prst="rect">
+              <a:avLst/>
+            </a:prstGeom>
+            <a:solidFill>
+              <a:srgbClr val="C5E0B4"/>
+            </a:solidFill>
+            <a:ln>
+              <a:solidFill>
+                <a:srgbClr val="000000"/>
+              </a:solidFill>
+            </a:ln>
+          </p:spPr>
+          <p:style>
+            <a:lnRef idx="1">
+              <a:schemeClr val="accent1"/>
+            </a:lnRef>
+            <a:fillRef idx="3">
+              <a:schemeClr val="accent1"/>
+            </a:fillRef>
+            <a:effectRef idx="2">
+              <a:schemeClr val="accent1"/>
+            </a:effectRef>
+            <a:fontRef idx="minor">
+              <a:schemeClr val="lt1"/>
+            </a:fontRef>
+          </p:style>
+          <p:txBody>
+            <a:bodyPr rtlCol="0" anchor="t"/>
+            <a:lstStyle/>
+            <a:p>
+              <a:pPr marL="0" algn="r" defTabSz="457200" rtl="0" eaLnBrk="1" latinLnBrk="0" hangingPunct="1"/>
+              <a:r>
+                <a:rPr sz="1800">
+                  <a:solidFill>
+                    <a:srgbClr val="000000"/>
+                  </a:solidFill>
+                  <a:latin typeface="Calibri"/>
+                </a:rPr>
+                <a:t/>
+              </a:r>
+              <a:endParaRPr dirty="0"/>
+            </a:p>
+          </p:txBody>
+        </p:sp>
+      </p:grpSp>
+      <p:grpSp>
+        <p:nvGrpSpPr>
+          <p:cNvPr id="5" name="event4">
             <a:extLst>
               <a:ext uri="{FF2B5EF4-FFF2-40B4-BE49-F238E27FC236}">
-                <a16:creationId xmlns:a16="http://schemas.microsoft.com/office/drawing/2014/main" id="{69A69EA1-9749-504B-B55E-8DF2BC89E141}"/>
+                <a16:creationId xmlns:a16="http://schemas.microsoft.com/office/drawing/2014/main" id="{875FF545-725D-ED41-9E7E-653BA9C084A4}"/>
               </a:ext>
             </a:extLst>
           </p:cNvPr>
-          <p:cNvSpPr/>
+          <p:cNvGrpSpPr/>
           <p:nvPr/>
-        </p:nvSpPr>
-        <p:spPr>
+        </p:nvGrpSpPr>
+        <p:grpSpPr>
           <a:xfrm>
-            <a:off x="245827" y="1006119"/>
-            <a:ext cx="3428102" cy="678040"/>
+            <a:off x="128833" y="1006119"/>
+            <a:ext cx="3428102" cy="4888500"/>
+            <a:chOff x="128833" y="1006119"/>
+            <a:chExt cx="3428102" cy="4888500"/>
           </a:xfrm>
-          <a:prstGeom prst="rect">
-            <a:avLst/>
-          </a:prstGeom>
-          <a:solidFill>
-            <a:schemeClr val="accent1">
-              <a:lumMod val="60000"/>
-              <a:lumOff val="40000"/>
-            </a:schemeClr>
-          </a:solidFill>
-          <a:ln>
+        </p:grpSpPr>
+        <p:sp>
+          <p:nvSpPr>
+            <p:cNvPr id="28" name="head">
+              <a:extLst>
+                <a:ext uri="{FF2B5EF4-FFF2-40B4-BE49-F238E27FC236}">
+                  <a16:creationId xmlns:a16="http://schemas.microsoft.com/office/drawing/2014/main" id="{B74983DA-2F04-BD4E-9062-143E2F989B94}"/>
+                </a:ext>
+              </a:extLst>
+            </p:cNvPr>
+            <p:cNvSpPr/>
+            <p:nvPr/>
+          </p:nvSpPr>
+          <p:spPr>
+            <a:xfrm>
+              <a:off x="128833" y="1006119"/>
+              <a:ext cx="3428102" cy="678040"/>
+            </a:xfrm>
+            <a:prstGeom prst="rect">
+              <a:avLst/>
+            </a:prstGeom>
             <a:solidFill>
-              <a:srgbClr val="000000"/>
+              <a:schemeClr val="accent1">
+                <a:lumMod val="60000"/>
+                <a:lumOff val="40000"/>
+              </a:schemeClr>
             </a:solidFill>
-          </a:ln>
-        </p:spPr>
-        <p:style>
-          <a:lnRef idx="1">
-            <a:schemeClr val="accent1"/>
-          </a:lnRef>
-          <a:fillRef idx="3">
-            <a:schemeClr val="accent1"/>
-          </a:fillRef>
-          <a:effectRef idx="2">
-            <a:schemeClr val="accent1"/>
-          </a:effectRef>
-          <a:fontRef idx="minor">
-            <a:schemeClr val="lt1"/>
-          </a:fontRef>
-        </p:style>
-        <p:txBody>
-          <a:bodyPr rtlCol="0" anchor="ctr"/>
-          <a:lstStyle/>
-          <a:p>
-            <a:r>
-              <a:t>4</a:t>
-            </a:r>
-          </a:p>
-        </p:txBody>
-      </p:sp>
-      <p:sp>
-        <p:nvSpPr>
-          <p:cNvPr id="13" name="subject3">
+            <a:ln>
+              <a:solidFill>
+                <a:srgbClr val="000000"/>
+              </a:solidFill>
+            </a:ln>
+          </p:spPr>
+          <p:style>
+            <a:lnRef idx="1">
+              <a:schemeClr val="accent1"/>
+            </a:lnRef>
+            <a:fillRef idx="3">
+              <a:schemeClr val="accent1"/>
+            </a:fillRef>
+            <a:effectRef idx="2">
+              <a:schemeClr val="accent1"/>
+            </a:effectRef>
+            <a:fontRef idx="minor">
+              <a:schemeClr val="lt1"/>
+            </a:fontRef>
+          </p:style>
+          <p:txBody>
+            <a:bodyPr rtlCol="0" anchor="ctr"/>
+            <a:lstStyle/>
+            <a:p>
+              <a:pPr algn="ctr"/>
+              <a:r>
+                <a:rPr b="1" sz="2400">
+                  <a:solidFill>
+                    <a:srgbClr val="000000"/>
+                  </a:solidFill>
+                  <a:latin typeface="Calibri"/>
+                </a:rPr>
+                <a:t/>
+              </a:r>
+              <a:endParaRPr dirty="0"/>
+            </a:p>
+          </p:txBody>
+        </p:sp>
+        <p:sp>
+          <p:nvSpPr>
+            <p:cNvPr id="31" name="description">
+              <a:extLst>
+                <a:ext uri="{FF2B5EF4-FFF2-40B4-BE49-F238E27FC236}">
+                  <a16:creationId xmlns:a16="http://schemas.microsoft.com/office/drawing/2014/main" id="{99FA94E4-4569-BC40-9BF0-4992F48417DB}"/>
+                </a:ext>
+              </a:extLst>
+            </p:cNvPr>
+            <p:cNvSpPr/>
+            <p:nvPr/>
+          </p:nvSpPr>
+          <p:spPr>
+            <a:xfrm>
+              <a:off x="128833" y="1782133"/>
+              <a:ext cx="3428102" cy="4112486"/>
+            </a:xfrm>
+            <a:prstGeom prst="rect">
+              <a:avLst/>
+            </a:prstGeom>
+            <a:solidFill>
+              <a:srgbClr val="C5E0B4"/>
+            </a:solidFill>
+            <a:ln>
+              <a:solidFill>
+                <a:srgbClr val="000000"/>
+              </a:solidFill>
+            </a:ln>
+          </p:spPr>
+          <p:style>
+            <a:lnRef idx="1">
+              <a:schemeClr val="accent1"/>
+            </a:lnRef>
+            <a:fillRef idx="3">
+              <a:schemeClr val="accent1"/>
+            </a:fillRef>
+            <a:effectRef idx="2">
+              <a:schemeClr val="accent1"/>
+            </a:effectRef>
+            <a:fontRef idx="minor">
+              <a:schemeClr val="lt1"/>
+            </a:fontRef>
+          </p:style>
+          <p:txBody>
+            <a:bodyPr rtlCol="0" anchor="t"/>
+            <a:lstStyle/>
+            <a:p>
+              <a:pPr algn="r" rtl="1"/>
+              <a:r>
+                <a:rPr sz="1800">
+                  <a:solidFill>
+                    <a:srgbClr val="000000"/>
+                  </a:solidFill>
+                  <a:latin typeface="Calibri"/>
+                </a:rPr>
+                <a:t/>
+              </a:r>
+              <a:endParaRPr dirty="0"/>
+            </a:p>
+          </p:txBody>
+        </p:sp>
+      </p:grpSp>
+    </p:spTree>
+  </p:cSld>
+  <p:clrMapOvr>
+    <a:masterClrMapping/>
+  </p:clrMapOvr>
+</p:sld>
+</file>
+
+<file path=ppt/slides/slide3.xml><?xml version="1.0" encoding="utf-8"?>
+<p:sld xmlns:a="http://schemas.openxmlformats.org/drawingml/2006/main" xmlns:r="http://schemas.openxmlformats.org/officeDocument/2006/relationships" xmlns:p="http://schemas.openxmlformats.org/presentationml/2006/main">
+  <p:cSld>
+    <p:spTree>
+      <p:nvGrpSpPr>
+        <p:cNvPr id="1" name=""/>
+        <p:cNvGrpSpPr/>
+        <p:nvPr/>
+      </p:nvGrpSpPr>
+      <p:grpSpPr>
+        <a:xfrm>
+          <a:off x="0" y="0"/>
+          <a:ext cx="0" cy="0"/>
+          <a:chOff x="0" y="0"/>
+          <a:chExt cx="0" cy="0"/>
+        </a:xfrm>
+      </p:grpSpPr>
+      <p:sp>
+        <p:nvSpPr>
+          <p:cNvPr id="16" name="subject1">
             <a:extLst>
               <a:ext uri="{FF2B5EF4-FFF2-40B4-BE49-F238E27FC236}">
-                <a16:creationId xmlns:a16="http://schemas.microsoft.com/office/drawing/2014/main" id="{9CB3B977-CEF9-004F-A635-4F7EDFD2A1BF}"/>
-              </a:ext>
-            </a:extLst>
-          </p:cNvPr>
-          <p:cNvSpPr/>
-          <p:nvPr/>
-        </p:nvSpPr>
-        <p:spPr>
-          <a:xfrm>
-            <a:off x="3826329" y="1006119"/>
-            <a:ext cx="3428102" cy="678040"/>
-          </a:xfrm>
-          <a:prstGeom prst="rect">
-            <a:avLst/>
-          </a:prstGeom>
-          <a:solidFill>
-            <a:schemeClr val="accent1">
-              <a:lumMod val="60000"/>
-              <a:lumOff val="40000"/>
-            </a:schemeClr>
-          </a:solidFill>
-          <a:ln>
-            <a:solidFill>
-              <a:srgbClr val="000000"/>
-            </a:solidFill>
-          </a:ln>
-        </p:spPr>
-        <p:style>
-          <a:lnRef idx="1">
-            <a:schemeClr val="accent1"/>
-          </a:lnRef>
-          <a:fillRef idx="3">
-            <a:schemeClr val="accent1"/>
-          </a:fillRef>
-          <a:effectRef idx="2">
-            <a:schemeClr val="accent1"/>
-          </a:effectRef>
-          <a:fontRef idx="minor">
-            <a:schemeClr val="lt1"/>
-          </a:fontRef>
-        </p:style>
-        <p:txBody>
-          <a:bodyPr rtlCol="0" anchor="ctr"/>
-          <a:lstStyle/>
-          <a:p>
-            <a:r>
-              <a:t>5</a:t>
-            </a:r>
-          </a:p>
-        </p:txBody>
-      </p:sp>
-      <p:sp>
-        <p:nvSpPr>
-          <p:cNvPr id="14" name="subject2">
-            <a:extLst>
-              <a:ext uri="{FF2B5EF4-FFF2-40B4-BE49-F238E27FC236}">
-                <a16:creationId xmlns:a16="http://schemas.microsoft.com/office/drawing/2014/main" id="{C95F852E-43F7-5F45-8881-0ACAC6C04A60}"/>
-              </a:ext>
-            </a:extLst>
-          </p:cNvPr>
-          <p:cNvSpPr/>
-          <p:nvPr/>
-        </p:nvSpPr>
-        <p:spPr>
-          <a:xfrm>
-            <a:off x="7406831" y="1006119"/>
-            <a:ext cx="3428102" cy="678040"/>
-          </a:xfrm>
-          <a:prstGeom prst="rect">
-            <a:avLst/>
-          </a:prstGeom>
-          <a:solidFill>
-            <a:schemeClr val="accent1">
-              <a:lumMod val="60000"/>
-              <a:lumOff val="40000"/>
-            </a:schemeClr>
-          </a:solidFill>
-          <a:ln>
-            <a:solidFill>
-              <a:srgbClr val="000000"/>
-            </a:solidFill>
-          </a:ln>
-        </p:spPr>
-        <p:style>
-          <a:lnRef idx="1">
-            <a:schemeClr val="accent1"/>
-          </a:lnRef>
-          <a:fillRef idx="3">
-            <a:schemeClr val="accent1"/>
-          </a:fillRef>
-          <a:effectRef idx="2">
-            <a:schemeClr val="accent1"/>
-          </a:effectRef>
-          <a:fontRef idx="minor">
-            <a:schemeClr val="lt1"/>
-          </a:fontRef>
-        </p:style>
-        <p:txBody>
-          <a:bodyPr rtlCol="0" anchor="ctr"/>
-          <a:lstStyle/>
-          <a:p>
-            <a:r>
-              <a:t>6</a:t>
-            </a:r>
-          </a:p>
-        </p:txBody>
-      </p:sp>
-      <p:sp>
-        <p:nvSpPr>
-          <p:cNvPr id="15" name="subject1">
-            <a:extLst>
-              <a:ext uri="{FF2B5EF4-FFF2-40B4-BE49-F238E27FC236}">
-                <a16:creationId xmlns:a16="http://schemas.microsoft.com/office/drawing/2014/main" id="{60BC0434-8D6E-CA4D-B372-29E89E3D1D42}"/>
+                <a16:creationId xmlns:a16="http://schemas.microsoft.com/office/drawing/2014/main" id="{FEE5B678-B000-1544-9111-B266DBCC1B62}"/>
               </a:ext>
             </a:extLst>
           </p:cNvPr>
@@ -3514,13 +3790,900 @@
           <a:bodyPr rtlCol="0" anchor="ctr"/>
           <a:lstStyle/>
           <a:p>
-            <a:r>
-              <a:t>7</a:t>
-            </a:r>
+            <a:pPr algn="ctr"/>
+            <a:r>
+              <a:rPr lang="he-IL" dirty="0"/>
+              <a:t> </a:t>
+            </a:r>
+            <a:endParaRPr dirty="0"/>
+          </a:p>
+        </p:txBody>
+      </p:sp>
+      <p:sp>
+        <p:nvSpPr>
+          <p:cNvPr id="26" name="subject2">
+            <a:extLst>
+              <a:ext uri="{FF2B5EF4-FFF2-40B4-BE49-F238E27FC236}">
+                <a16:creationId xmlns:a16="http://schemas.microsoft.com/office/drawing/2014/main" id="{C1F17590-EE40-C04F-963C-759CE997910A}"/>
+              </a:ext>
+            </a:extLst>
+          </p:cNvPr>
+          <p:cNvSpPr/>
+          <p:nvPr/>
+        </p:nvSpPr>
+        <p:spPr>
+          <a:xfrm>
+            <a:off x="7367833" y="1006119"/>
+            <a:ext cx="3428102" cy="678040"/>
+          </a:xfrm>
+          <a:prstGeom prst="rect">
+            <a:avLst/>
+          </a:prstGeom>
+          <a:solidFill>
+            <a:schemeClr val="accent1">
+              <a:lumMod val="60000"/>
+              <a:lumOff val="40000"/>
+            </a:schemeClr>
+          </a:solidFill>
+          <a:ln>
+            <a:solidFill>
+              <a:srgbClr val="000000"/>
+            </a:solidFill>
+          </a:ln>
+        </p:spPr>
+        <p:style>
+          <a:lnRef idx="1">
+            <a:schemeClr val="accent1"/>
+          </a:lnRef>
+          <a:fillRef idx="3">
+            <a:schemeClr val="accent1"/>
+          </a:fillRef>
+          <a:effectRef idx="2">
+            <a:schemeClr val="accent1"/>
+          </a:effectRef>
+          <a:fontRef idx="minor">
+            <a:schemeClr val="lt1"/>
+          </a:fontRef>
+        </p:style>
+        <p:txBody>
+          <a:bodyPr rtlCol="0" anchor="ctr"/>
+          <a:lstStyle/>
+          <a:p>
+            <a:pPr algn="ctr"/>
+            <a:r>
+              <a:rPr lang="he-IL" dirty="0"/>
+              <a:t> </a:t>
+            </a:r>
+            <a:endParaRPr dirty="0"/>
+          </a:p>
+        </p:txBody>
+      </p:sp>
+      <p:sp>
+        <p:nvSpPr>
+          <p:cNvPr id="27" name="subject3">
+            <a:extLst>
+              <a:ext uri="{FF2B5EF4-FFF2-40B4-BE49-F238E27FC236}">
+                <a16:creationId xmlns:a16="http://schemas.microsoft.com/office/drawing/2014/main" id="{8B131545-E880-AC4F-8174-C123EDCAE1A1}"/>
+              </a:ext>
+            </a:extLst>
+          </p:cNvPr>
+          <p:cNvSpPr/>
+          <p:nvPr/>
+        </p:nvSpPr>
+        <p:spPr>
+          <a:xfrm>
+            <a:off x="3748333" y="1012319"/>
+            <a:ext cx="3428102" cy="678040"/>
+          </a:xfrm>
+          <a:prstGeom prst="rect">
+            <a:avLst/>
+          </a:prstGeom>
+          <a:solidFill>
+            <a:schemeClr val="accent1">
+              <a:lumMod val="60000"/>
+              <a:lumOff val="40000"/>
+            </a:schemeClr>
+          </a:solidFill>
+          <a:ln>
+            <a:solidFill>
+              <a:srgbClr val="000000"/>
+            </a:solidFill>
+          </a:ln>
+        </p:spPr>
+        <p:style>
+          <a:lnRef idx="1">
+            <a:schemeClr val="accent1"/>
+          </a:lnRef>
+          <a:fillRef idx="3">
+            <a:schemeClr val="accent1"/>
+          </a:fillRef>
+          <a:effectRef idx="2">
+            <a:schemeClr val="accent1"/>
+          </a:effectRef>
+          <a:fontRef idx="minor">
+            <a:schemeClr val="lt1"/>
+          </a:fontRef>
+        </p:style>
+        <p:txBody>
+          <a:bodyPr rtlCol="0" anchor="ctr"/>
+          <a:lstStyle/>
+          <a:p>
+            <a:pPr algn="ctr"/>
+            <a:r>
+              <a:rPr lang="he-IL" dirty="0"/>
+              <a:t> </a:t>
+            </a:r>
+            <a:endParaRPr dirty="0"/>
+          </a:p>
+        </p:txBody>
+      </p:sp>
+      <p:sp>
+        <p:nvSpPr>
+          <p:cNvPr id="28" name="subject4">
+            <a:extLst>
+              <a:ext uri="{FF2B5EF4-FFF2-40B4-BE49-F238E27FC236}">
+                <a16:creationId xmlns:a16="http://schemas.microsoft.com/office/drawing/2014/main" id="{B74983DA-2F04-BD4E-9062-143E2F989B94}"/>
+              </a:ext>
+            </a:extLst>
+          </p:cNvPr>
+          <p:cNvSpPr/>
+          <p:nvPr/>
+        </p:nvSpPr>
+        <p:spPr>
+          <a:xfrm>
+            <a:off x="128833" y="1006119"/>
+            <a:ext cx="3428102" cy="678040"/>
+          </a:xfrm>
+          <a:prstGeom prst="rect">
+            <a:avLst/>
+          </a:prstGeom>
+          <a:solidFill>
+            <a:schemeClr val="accent1">
+              <a:lumMod val="60000"/>
+              <a:lumOff val="40000"/>
+            </a:schemeClr>
+          </a:solidFill>
+          <a:ln>
+            <a:solidFill>
+              <a:srgbClr val="000000"/>
+            </a:solidFill>
+          </a:ln>
+        </p:spPr>
+        <p:style>
+          <a:lnRef idx="1">
+            <a:schemeClr val="accent1"/>
+          </a:lnRef>
+          <a:fillRef idx="3">
+            <a:schemeClr val="accent1"/>
+          </a:fillRef>
+          <a:effectRef idx="2">
+            <a:schemeClr val="accent1"/>
+          </a:effectRef>
+          <a:fontRef idx="minor">
+            <a:schemeClr val="lt1"/>
+          </a:fontRef>
+        </p:style>
+        <p:txBody>
+          <a:bodyPr rtlCol="0" anchor="ctr"/>
+          <a:lstStyle/>
+          <a:p>
+            <a:pPr algn="ctr"/>
+            <a:r>
+              <a:rPr lang="he-IL" dirty="0"/>
+              <a:t> </a:t>
+            </a:r>
+            <a:endParaRPr dirty="0"/>
+          </a:p>
+        </p:txBody>
+      </p:sp>
+      <p:sp>
+        <p:nvSpPr>
+          <p:cNvPr id="25" name="text1">
+            <a:extLst>
+              <a:ext uri="{FF2B5EF4-FFF2-40B4-BE49-F238E27FC236}">
+                <a16:creationId xmlns:a16="http://schemas.microsoft.com/office/drawing/2014/main" id="{BA557B7E-6A41-9D46-AE23-DE2AEF6CDE47}"/>
+              </a:ext>
+            </a:extLst>
+          </p:cNvPr>
+          <p:cNvSpPr/>
+          <p:nvPr/>
+        </p:nvSpPr>
+        <p:spPr>
+          <a:xfrm>
+            <a:off x="10987333" y="1782133"/>
+            <a:ext cx="3428102" cy="4112486"/>
+          </a:xfrm>
+          <a:prstGeom prst="rect">
+            <a:avLst/>
+          </a:prstGeom>
+          <a:solidFill>
+            <a:schemeClr val="accent2">
+              <a:lumMod val="40000"/>
+              <a:lumOff val="60000"/>
+            </a:schemeClr>
+          </a:solidFill>
+          <a:ln>
+            <a:solidFill>
+              <a:srgbClr val="000000"/>
+            </a:solidFill>
+          </a:ln>
+        </p:spPr>
+        <p:style>
+          <a:lnRef idx="1">
+            <a:schemeClr val="accent1"/>
+          </a:lnRef>
+          <a:fillRef idx="3">
+            <a:schemeClr val="accent1"/>
+          </a:fillRef>
+          <a:effectRef idx="2">
+            <a:schemeClr val="accent1"/>
+          </a:effectRef>
+          <a:fontRef idx="minor">
+            <a:schemeClr val="lt1"/>
+          </a:fontRef>
+        </p:style>
+        <p:txBody>
+          <a:bodyPr rtlCol="0" anchor="ctr"/>
+          <a:lstStyle/>
+          <a:p>
+            <a:pPr marL="0" algn="ctr" defTabSz="457200" rtl="0" eaLnBrk="1" latinLnBrk="0" hangingPunct="1"/>
+            <a:endParaRPr dirty="0"/>
+          </a:p>
+        </p:txBody>
+      </p:sp>
+      <p:sp>
+        <p:nvSpPr>
+          <p:cNvPr id="29" name="text2">
+            <a:extLst>
+              <a:ext uri="{FF2B5EF4-FFF2-40B4-BE49-F238E27FC236}">
+                <a16:creationId xmlns:a16="http://schemas.microsoft.com/office/drawing/2014/main" id="{0735DE96-C1A4-4C4A-94D6-8C5E96B1AB2F}"/>
+              </a:ext>
+            </a:extLst>
+          </p:cNvPr>
+          <p:cNvSpPr/>
+          <p:nvPr/>
+        </p:nvSpPr>
+        <p:spPr>
+          <a:xfrm>
+            <a:off x="7367833" y="1782133"/>
+            <a:ext cx="3428102" cy="4112486"/>
+          </a:xfrm>
+          <a:prstGeom prst="rect">
+            <a:avLst/>
+          </a:prstGeom>
+          <a:solidFill>
+            <a:schemeClr val="accent2">
+              <a:lumMod val="40000"/>
+              <a:lumOff val="60000"/>
+            </a:schemeClr>
+          </a:solidFill>
+          <a:ln>
+            <a:solidFill>
+              <a:srgbClr val="000000"/>
+            </a:solidFill>
+          </a:ln>
+        </p:spPr>
+        <p:style>
+          <a:lnRef idx="1">
+            <a:schemeClr val="accent1"/>
+          </a:lnRef>
+          <a:fillRef idx="3">
+            <a:schemeClr val="accent1"/>
+          </a:fillRef>
+          <a:effectRef idx="2">
+            <a:schemeClr val="accent1"/>
+          </a:effectRef>
+          <a:fontRef idx="minor">
+            <a:schemeClr val="lt1"/>
+          </a:fontRef>
+        </p:style>
+        <p:txBody>
+          <a:bodyPr rtlCol="0" anchor="ctr"/>
+          <a:lstStyle/>
+          <a:p>
+            <a:pPr marL="0" algn="ctr" defTabSz="457200" rtl="0" eaLnBrk="1" latinLnBrk="0" hangingPunct="1"/>
+            <a:endParaRPr dirty="0"/>
+          </a:p>
+        </p:txBody>
+      </p:sp>
+      <p:sp>
+        <p:nvSpPr>
+          <p:cNvPr id="30" name="text3">
+            <a:extLst>
+              <a:ext uri="{FF2B5EF4-FFF2-40B4-BE49-F238E27FC236}">
+                <a16:creationId xmlns:a16="http://schemas.microsoft.com/office/drawing/2014/main" id="{A47C5602-A593-1E48-90B8-0B00559ACE32}"/>
+              </a:ext>
+            </a:extLst>
+          </p:cNvPr>
+          <p:cNvSpPr/>
+          <p:nvPr/>
+        </p:nvSpPr>
+        <p:spPr>
+          <a:xfrm>
+            <a:off x="3748333" y="1782133"/>
+            <a:ext cx="3428102" cy="4112486"/>
+          </a:xfrm>
+          <a:prstGeom prst="rect">
+            <a:avLst/>
+          </a:prstGeom>
+          <a:solidFill>
+            <a:schemeClr val="accent2">
+              <a:lumMod val="40000"/>
+              <a:lumOff val="60000"/>
+            </a:schemeClr>
+          </a:solidFill>
+          <a:ln>
+            <a:solidFill>
+              <a:srgbClr val="000000"/>
+            </a:solidFill>
+          </a:ln>
+        </p:spPr>
+        <p:style>
+          <a:lnRef idx="1">
+            <a:schemeClr val="accent1"/>
+          </a:lnRef>
+          <a:fillRef idx="3">
+            <a:schemeClr val="accent1"/>
+          </a:fillRef>
+          <a:effectRef idx="2">
+            <a:schemeClr val="accent1"/>
+          </a:effectRef>
+          <a:fontRef idx="minor">
+            <a:schemeClr val="lt1"/>
+          </a:fontRef>
+        </p:style>
+        <p:txBody>
+          <a:bodyPr rtlCol="0" anchor="ctr"/>
+          <a:lstStyle/>
+          <a:p>
+            <a:pPr marL="0" algn="ctr" defTabSz="457200" rtl="0" eaLnBrk="1" latinLnBrk="0" hangingPunct="1"/>
+            <a:endParaRPr dirty="0"/>
+          </a:p>
+        </p:txBody>
+      </p:sp>
+      <p:sp>
+        <p:nvSpPr>
+          <p:cNvPr id="31" name="text4">
+            <a:extLst>
+              <a:ext uri="{FF2B5EF4-FFF2-40B4-BE49-F238E27FC236}">
+                <a16:creationId xmlns:a16="http://schemas.microsoft.com/office/drawing/2014/main" id="{99FA94E4-4569-BC40-9BF0-4992F48417DB}"/>
+              </a:ext>
+            </a:extLst>
+          </p:cNvPr>
+          <p:cNvSpPr/>
+          <p:nvPr/>
+        </p:nvSpPr>
+        <p:spPr>
+          <a:xfrm>
+            <a:off x="128833" y="1782133"/>
+            <a:ext cx="3428102" cy="4112486"/>
+          </a:xfrm>
+          <a:prstGeom prst="rect">
+            <a:avLst/>
+          </a:prstGeom>
+          <a:solidFill>
+            <a:schemeClr val="accent2">
+              <a:lumMod val="40000"/>
+              <a:lumOff val="60000"/>
+            </a:schemeClr>
+          </a:solidFill>
+          <a:ln>
+            <a:solidFill>
+              <a:srgbClr val="000000"/>
+            </a:solidFill>
+          </a:ln>
+        </p:spPr>
+        <p:style>
+          <a:lnRef idx="1">
+            <a:schemeClr val="accent1"/>
+          </a:lnRef>
+          <a:fillRef idx="3">
+            <a:schemeClr val="accent1"/>
+          </a:fillRef>
+          <a:effectRef idx="2">
+            <a:schemeClr val="accent1"/>
+          </a:effectRef>
+          <a:fontRef idx="minor">
+            <a:schemeClr val="lt1"/>
+          </a:fontRef>
+        </p:style>
+        <p:txBody>
+          <a:bodyPr rtlCol="0" anchor="ctr"/>
+          <a:lstStyle/>
+          <a:p>
+            <a:pPr marL="0" algn="ctr" defTabSz="457200" rtl="1" eaLnBrk="1" latinLnBrk="0" hangingPunct="1"/>
+            <a:endParaRPr dirty="0"/>
           </a:p>
         </p:txBody>
       </p:sp>
     </p:spTree>
+    <p:extLst>
+      <p:ext uri="{BB962C8B-B14F-4D97-AF65-F5344CB8AC3E}">
+        <p14:creationId xmlns:p14="http://schemas.microsoft.com/office/powerpoint/2010/main" val="935261557"/>
+      </p:ext>
+    </p:extLst>
+  </p:cSld>
+  <p:clrMapOvr>
+    <a:masterClrMapping/>
+  </p:clrMapOvr>
+</p:sld>
+</file>
+
+<file path=ppt/slides/slide4.xml><?xml version="1.0" encoding="utf-8"?>
+<p:sld xmlns:a="http://schemas.openxmlformats.org/drawingml/2006/main" xmlns:r="http://schemas.openxmlformats.org/officeDocument/2006/relationships" xmlns:p="http://schemas.openxmlformats.org/presentationml/2006/main">
+  <p:cSld>
+    <p:spTree>
+      <p:nvGrpSpPr>
+        <p:cNvPr id="1" name=""/>
+        <p:cNvGrpSpPr/>
+        <p:nvPr/>
+      </p:nvGrpSpPr>
+      <p:grpSpPr>
+        <a:xfrm>
+          <a:off x="0" y="0"/>
+          <a:ext cx="0" cy="0"/>
+          <a:chOff x="0" y="0"/>
+          <a:chExt cx="0" cy="0"/>
+        </a:xfrm>
+      </p:grpSpPr>
+      <p:sp>
+        <p:nvSpPr>
+          <p:cNvPr id="16" name="subject1">
+            <a:extLst>
+              <a:ext uri="{FF2B5EF4-FFF2-40B4-BE49-F238E27FC236}">
+                <a16:creationId xmlns:a16="http://schemas.microsoft.com/office/drawing/2014/main" id="{FEE5B678-B000-1544-9111-B266DBCC1B62}"/>
+              </a:ext>
+            </a:extLst>
+          </p:cNvPr>
+          <p:cNvSpPr/>
+          <p:nvPr/>
+        </p:nvSpPr>
+        <p:spPr>
+          <a:xfrm>
+            <a:off x="10987333" y="1006119"/>
+            <a:ext cx="3428102" cy="678040"/>
+          </a:xfrm>
+          <a:prstGeom prst="rect">
+            <a:avLst/>
+          </a:prstGeom>
+          <a:solidFill>
+            <a:schemeClr val="accent1">
+              <a:lumMod val="60000"/>
+              <a:lumOff val="40000"/>
+            </a:schemeClr>
+          </a:solidFill>
+          <a:ln>
+            <a:solidFill>
+              <a:srgbClr val="000000"/>
+            </a:solidFill>
+          </a:ln>
+        </p:spPr>
+        <p:style>
+          <a:lnRef idx="1">
+            <a:schemeClr val="accent1"/>
+          </a:lnRef>
+          <a:fillRef idx="3">
+            <a:schemeClr val="accent1"/>
+          </a:fillRef>
+          <a:effectRef idx="2">
+            <a:schemeClr val="accent1"/>
+          </a:effectRef>
+          <a:fontRef idx="minor">
+            <a:schemeClr val="lt1"/>
+          </a:fontRef>
+        </p:style>
+        <p:txBody>
+          <a:bodyPr rtlCol="0" anchor="ctr"/>
+          <a:lstStyle/>
+          <a:p>
+            <a:pPr algn="ctr"/>
+            <a:r>
+              <a:rPr lang="he-IL" dirty="0"/>
+              <a:t> </a:t>
+            </a:r>
+            <a:endParaRPr dirty="0"/>
+          </a:p>
+        </p:txBody>
+      </p:sp>
+      <p:sp>
+        <p:nvSpPr>
+          <p:cNvPr id="26" name="subject2">
+            <a:extLst>
+              <a:ext uri="{FF2B5EF4-FFF2-40B4-BE49-F238E27FC236}">
+                <a16:creationId xmlns:a16="http://schemas.microsoft.com/office/drawing/2014/main" id="{C1F17590-EE40-C04F-963C-759CE997910A}"/>
+              </a:ext>
+            </a:extLst>
+          </p:cNvPr>
+          <p:cNvSpPr/>
+          <p:nvPr/>
+        </p:nvSpPr>
+        <p:spPr>
+          <a:xfrm>
+            <a:off x="7367833" y="1006119"/>
+            <a:ext cx="3428102" cy="678040"/>
+          </a:xfrm>
+          <a:prstGeom prst="rect">
+            <a:avLst/>
+          </a:prstGeom>
+          <a:solidFill>
+            <a:schemeClr val="accent1">
+              <a:lumMod val="60000"/>
+              <a:lumOff val="40000"/>
+            </a:schemeClr>
+          </a:solidFill>
+          <a:ln>
+            <a:solidFill>
+              <a:srgbClr val="000000"/>
+            </a:solidFill>
+          </a:ln>
+        </p:spPr>
+        <p:style>
+          <a:lnRef idx="1">
+            <a:schemeClr val="accent1"/>
+          </a:lnRef>
+          <a:fillRef idx="3">
+            <a:schemeClr val="accent1"/>
+          </a:fillRef>
+          <a:effectRef idx="2">
+            <a:schemeClr val="accent1"/>
+          </a:effectRef>
+          <a:fontRef idx="minor">
+            <a:schemeClr val="lt1"/>
+          </a:fontRef>
+        </p:style>
+        <p:txBody>
+          <a:bodyPr rtlCol="0" anchor="ctr"/>
+          <a:lstStyle/>
+          <a:p>
+            <a:pPr algn="ctr"/>
+            <a:r>
+              <a:rPr lang="he-IL" dirty="0"/>
+              <a:t> </a:t>
+            </a:r>
+            <a:endParaRPr dirty="0"/>
+          </a:p>
+        </p:txBody>
+      </p:sp>
+      <p:sp>
+        <p:nvSpPr>
+          <p:cNvPr id="27" name="subject3">
+            <a:extLst>
+              <a:ext uri="{FF2B5EF4-FFF2-40B4-BE49-F238E27FC236}">
+                <a16:creationId xmlns:a16="http://schemas.microsoft.com/office/drawing/2014/main" id="{8B131545-E880-AC4F-8174-C123EDCAE1A1}"/>
+              </a:ext>
+            </a:extLst>
+          </p:cNvPr>
+          <p:cNvSpPr/>
+          <p:nvPr/>
+        </p:nvSpPr>
+        <p:spPr>
+          <a:xfrm>
+            <a:off x="3748333" y="1012319"/>
+            <a:ext cx="3428102" cy="678040"/>
+          </a:xfrm>
+          <a:prstGeom prst="rect">
+            <a:avLst/>
+          </a:prstGeom>
+          <a:solidFill>
+            <a:schemeClr val="accent1">
+              <a:lumMod val="60000"/>
+              <a:lumOff val="40000"/>
+            </a:schemeClr>
+          </a:solidFill>
+          <a:ln>
+            <a:solidFill>
+              <a:srgbClr val="000000"/>
+            </a:solidFill>
+          </a:ln>
+        </p:spPr>
+        <p:style>
+          <a:lnRef idx="1">
+            <a:schemeClr val="accent1"/>
+          </a:lnRef>
+          <a:fillRef idx="3">
+            <a:schemeClr val="accent1"/>
+          </a:fillRef>
+          <a:effectRef idx="2">
+            <a:schemeClr val="accent1"/>
+          </a:effectRef>
+          <a:fontRef idx="minor">
+            <a:schemeClr val="lt1"/>
+          </a:fontRef>
+        </p:style>
+        <p:txBody>
+          <a:bodyPr rtlCol="0" anchor="ctr"/>
+          <a:lstStyle/>
+          <a:p>
+            <a:pPr algn="ctr"/>
+            <a:r>
+              <a:rPr lang="he-IL" dirty="0"/>
+              <a:t> </a:t>
+            </a:r>
+            <a:endParaRPr dirty="0"/>
+          </a:p>
+        </p:txBody>
+      </p:sp>
+      <p:sp>
+        <p:nvSpPr>
+          <p:cNvPr id="28" name="subject4">
+            <a:extLst>
+              <a:ext uri="{FF2B5EF4-FFF2-40B4-BE49-F238E27FC236}">
+                <a16:creationId xmlns:a16="http://schemas.microsoft.com/office/drawing/2014/main" id="{B74983DA-2F04-BD4E-9062-143E2F989B94}"/>
+              </a:ext>
+            </a:extLst>
+          </p:cNvPr>
+          <p:cNvSpPr/>
+          <p:nvPr/>
+        </p:nvSpPr>
+        <p:spPr>
+          <a:xfrm>
+            <a:off x="128833" y="1006119"/>
+            <a:ext cx="3428102" cy="678040"/>
+          </a:xfrm>
+          <a:prstGeom prst="rect">
+            <a:avLst/>
+          </a:prstGeom>
+          <a:solidFill>
+            <a:schemeClr val="accent1">
+              <a:lumMod val="60000"/>
+              <a:lumOff val="40000"/>
+            </a:schemeClr>
+          </a:solidFill>
+          <a:ln>
+            <a:solidFill>
+              <a:srgbClr val="000000"/>
+            </a:solidFill>
+          </a:ln>
+        </p:spPr>
+        <p:style>
+          <a:lnRef idx="1">
+            <a:schemeClr val="accent1"/>
+          </a:lnRef>
+          <a:fillRef idx="3">
+            <a:schemeClr val="accent1"/>
+          </a:fillRef>
+          <a:effectRef idx="2">
+            <a:schemeClr val="accent1"/>
+          </a:effectRef>
+          <a:fontRef idx="minor">
+            <a:schemeClr val="lt1"/>
+          </a:fontRef>
+        </p:style>
+        <p:txBody>
+          <a:bodyPr rtlCol="0" anchor="ctr"/>
+          <a:lstStyle/>
+          <a:p>
+            <a:pPr algn="ctr"/>
+            <a:r>
+              <a:rPr lang="he-IL" dirty="0"/>
+              <a:t> </a:t>
+            </a:r>
+            <a:endParaRPr dirty="0"/>
+          </a:p>
+        </p:txBody>
+      </p:sp>
+      <p:sp>
+        <p:nvSpPr>
+          <p:cNvPr id="25" name="text1">
+            <a:extLst>
+              <a:ext uri="{FF2B5EF4-FFF2-40B4-BE49-F238E27FC236}">
+                <a16:creationId xmlns:a16="http://schemas.microsoft.com/office/drawing/2014/main" id="{BA557B7E-6A41-9D46-AE23-DE2AEF6CDE47}"/>
+              </a:ext>
+            </a:extLst>
+          </p:cNvPr>
+          <p:cNvSpPr/>
+          <p:nvPr/>
+        </p:nvSpPr>
+        <p:spPr>
+          <a:xfrm>
+            <a:off x="10987333" y="1782133"/>
+            <a:ext cx="3428102" cy="4112486"/>
+          </a:xfrm>
+          <a:prstGeom prst="rect">
+            <a:avLst/>
+          </a:prstGeom>
+          <a:solidFill>
+            <a:schemeClr val="bg1">
+              <a:lumMod val="85000"/>
+            </a:schemeClr>
+          </a:solidFill>
+          <a:ln>
+            <a:solidFill>
+              <a:srgbClr val="000000"/>
+            </a:solidFill>
+          </a:ln>
+        </p:spPr>
+        <p:style>
+          <a:lnRef idx="1">
+            <a:schemeClr val="accent1"/>
+          </a:lnRef>
+          <a:fillRef idx="3">
+            <a:schemeClr val="accent1"/>
+          </a:fillRef>
+          <a:effectRef idx="2">
+            <a:schemeClr val="accent1"/>
+          </a:effectRef>
+          <a:fontRef idx="minor">
+            <a:schemeClr val="lt1"/>
+          </a:fontRef>
+        </p:style>
+        <p:txBody>
+          <a:bodyPr rtlCol="0" anchor="ctr"/>
+          <a:lstStyle/>
+          <a:p>
+            <a:pPr marL="0" algn="ctr" defTabSz="457200" rtl="0" eaLnBrk="1" latinLnBrk="0" hangingPunct="1"/>
+            <a:endParaRPr dirty="0"/>
+          </a:p>
+        </p:txBody>
+      </p:sp>
+      <p:sp>
+        <p:nvSpPr>
+          <p:cNvPr id="29" name="text2">
+            <a:extLst>
+              <a:ext uri="{FF2B5EF4-FFF2-40B4-BE49-F238E27FC236}">
+                <a16:creationId xmlns:a16="http://schemas.microsoft.com/office/drawing/2014/main" id="{0735DE96-C1A4-4C4A-94D6-8C5E96B1AB2F}"/>
+              </a:ext>
+            </a:extLst>
+          </p:cNvPr>
+          <p:cNvSpPr/>
+          <p:nvPr/>
+        </p:nvSpPr>
+        <p:spPr>
+          <a:xfrm>
+            <a:off x="7367833" y="1782133"/>
+            <a:ext cx="3428102" cy="4112486"/>
+          </a:xfrm>
+          <a:prstGeom prst="rect">
+            <a:avLst/>
+          </a:prstGeom>
+          <a:solidFill>
+            <a:schemeClr val="bg1">
+              <a:lumMod val="85000"/>
+            </a:schemeClr>
+          </a:solidFill>
+          <a:ln>
+            <a:solidFill>
+              <a:srgbClr val="000000"/>
+            </a:solidFill>
+          </a:ln>
+        </p:spPr>
+        <p:style>
+          <a:lnRef idx="1">
+            <a:schemeClr val="accent1"/>
+          </a:lnRef>
+          <a:fillRef idx="3">
+            <a:schemeClr val="accent1"/>
+          </a:fillRef>
+          <a:effectRef idx="2">
+            <a:schemeClr val="accent1"/>
+          </a:effectRef>
+          <a:fontRef idx="minor">
+            <a:schemeClr val="lt1"/>
+          </a:fontRef>
+        </p:style>
+        <p:txBody>
+          <a:bodyPr rtlCol="0" anchor="ctr"/>
+          <a:lstStyle/>
+          <a:p>
+            <a:pPr marL="0" algn="ctr" defTabSz="457200" rtl="0" eaLnBrk="1" latinLnBrk="0" hangingPunct="1"/>
+            <a:endParaRPr dirty="0"/>
+          </a:p>
+        </p:txBody>
+      </p:sp>
+      <p:sp>
+        <p:nvSpPr>
+          <p:cNvPr id="30" name="text3">
+            <a:extLst>
+              <a:ext uri="{FF2B5EF4-FFF2-40B4-BE49-F238E27FC236}">
+                <a16:creationId xmlns:a16="http://schemas.microsoft.com/office/drawing/2014/main" id="{A47C5602-A593-1E48-90B8-0B00559ACE32}"/>
+              </a:ext>
+            </a:extLst>
+          </p:cNvPr>
+          <p:cNvSpPr/>
+          <p:nvPr/>
+        </p:nvSpPr>
+        <p:spPr>
+          <a:xfrm>
+            <a:off x="3748333" y="1782133"/>
+            <a:ext cx="3428102" cy="4112486"/>
+          </a:xfrm>
+          <a:prstGeom prst="rect">
+            <a:avLst/>
+          </a:prstGeom>
+          <a:solidFill>
+            <a:schemeClr val="bg1">
+              <a:lumMod val="85000"/>
+            </a:schemeClr>
+          </a:solidFill>
+          <a:ln>
+            <a:solidFill>
+              <a:srgbClr val="000000"/>
+            </a:solidFill>
+          </a:ln>
+        </p:spPr>
+        <p:style>
+          <a:lnRef idx="1">
+            <a:schemeClr val="accent1"/>
+          </a:lnRef>
+          <a:fillRef idx="3">
+            <a:schemeClr val="accent1"/>
+          </a:fillRef>
+          <a:effectRef idx="2">
+            <a:schemeClr val="accent1"/>
+          </a:effectRef>
+          <a:fontRef idx="minor">
+            <a:schemeClr val="lt1"/>
+          </a:fontRef>
+        </p:style>
+        <p:txBody>
+          <a:bodyPr rtlCol="0" anchor="ctr"/>
+          <a:lstStyle/>
+          <a:p>
+            <a:pPr marL="0" algn="ctr" defTabSz="457200" rtl="0" eaLnBrk="1" latinLnBrk="0" hangingPunct="1"/>
+            <a:endParaRPr dirty="0"/>
+          </a:p>
+        </p:txBody>
+      </p:sp>
+      <p:sp>
+        <p:nvSpPr>
+          <p:cNvPr id="31" name="text4">
+            <a:extLst>
+              <a:ext uri="{FF2B5EF4-FFF2-40B4-BE49-F238E27FC236}">
+                <a16:creationId xmlns:a16="http://schemas.microsoft.com/office/drawing/2014/main" id="{99FA94E4-4569-BC40-9BF0-4992F48417DB}"/>
+              </a:ext>
+            </a:extLst>
+          </p:cNvPr>
+          <p:cNvSpPr/>
+          <p:nvPr/>
+        </p:nvSpPr>
+        <p:spPr>
+          <a:xfrm>
+            <a:off x="128833" y="1782133"/>
+            <a:ext cx="3428102" cy="4112486"/>
+          </a:xfrm>
+          <a:prstGeom prst="rect">
+            <a:avLst/>
+          </a:prstGeom>
+          <a:solidFill>
+            <a:schemeClr val="bg1">
+              <a:lumMod val="85000"/>
+            </a:schemeClr>
+          </a:solidFill>
+          <a:ln>
+            <a:solidFill>
+              <a:srgbClr val="000000"/>
+            </a:solidFill>
+          </a:ln>
+        </p:spPr>
+        <p:style>
+          <a:lnRef idx="1">
+            <a:schemeClr val="accent1"/>
+          </a:lnRef>
+          <a:fillRef idx="3">
+            <a:schemeClr val="accent1"/>
+          </a:fillRef>
+          <a:effectRef idx="2">
+            <a:schemeClr val="accent1"/>
+          </a:effectRef>
+          <a:fontRef idx="minor">
+            <a:schemeClr val="lt1"/>
+          </a:fontRef>
+        </p:style>
+        <p:txBody>
+          <a:bodyPr rtlCol="0" anchor="ctr"/>
+          <a:lstStyle/>
+          <a:p>
+            <a:pPr marL="0" algn="ctr" defTabSz="457200" rtl="0" eaLnBrk="1" latinLnBrk="0" hangingPunct="1"/>
+            <a:endParaRPr dirty="0"/>
+          </a:p>
+        </p:txBody>
+      </p:sp>
+    </p:spTree>
+    <p:extLst>
+      <p:ext uri="{BB962C8B-B14F-4D97-AF65-F5344CB8AC3E}">
+        <p14:creationId xmlns:p14="http://schemas.microsoft.com/office/powerpoint/2010/main" val="4246108961"/>
+      </p:ext>
+    </p:extLst>
   </p:cSld>
   <p:clrMapOvr>
     <a:masterClrMapping/>

</xml_diff>